<commit_message>
update code with explain
</commit_message>
<xml_diff>
--- a/Cell_Injury___Adaptation__Inflammation___Healing___Hemodynamic_Exam__Gynae_July_25__C.pptx
+++ b/Cell_Injury___Adaptation__Inflammation___Healing___Hemodynamic_Exam__Gynae_July_25__C.pptx
@@ -3786,7 +3786,7 @@
       </p:sp>
       <p:pic>
         <p:nvPicPr>
-          <p:cNvPr id="4" name="Picture 3" descr="RZjFHUmMtn.jpg"/>
+          <p:cNvPr id="4" name="Picture 3" descr="hbRzZoqYbt.jpg"/>
           <p:cNvPicPr>
             <a:picLocks noChangeAspect="1"/>
           </p:cNvPicPr>
@@ -5621,7 +5621,7 @@
       </p:sp>
       <p:pic>
         <p:nvPicPr>
-          <p:cNvPr id="4" name="Picture 3" descr="WaxckonIWq.jpg"/>
+          <p:cNvPr id="4" name="Picture 3" descr="TyDILNPYVl.jpg"/>
           <p:cNvPicPr>
             <a:picLocks noChangeAspect="1"/>
           </p:cNvPicPr>
@@ -8344,7 +8344,7 @@
       </p:sp>
       <p:pic>
         <p:nvPicPr>
-          <p:cNvPr id="4" name="Picture 3" descr="ANuXASyrTJ.jpg"/>
+          <p:cNvPr id="4" name="Picture 3" descr="jPLVSoSlRw.jpg"/>
           <p:cNvPicPr>
             <a:picLocks noChangeAspect="1"/>
           </p:cNvPicPr>

</xml_diff>

<commit_message>
final update power point
</commit_message>
<xml_diff>
--- a/Cell_Injury___Adaptation__Inflammation___Healing___Hemodynamic_Exam__Gynae_July_25__C.pptx
+++ b/Cell_Injury___Adaptation__Inflammation___Healing___Hemodynamic_Exam__Gynae_July_25__C.pptx
@@ -3254,7 +3254,7 @@
               <a:defRPr b="1" sz="1800"/>
             </a:pPr>
             <a:r>
-              <a:t>Ans: TFFFT</a:t>
+              <a:t>Ans: TFFFT [Ref: Robbins Basic Pathology/10th/P-93] </a:t>
             </a:r>
           </a:p>
         </p:txBody>
@@ -3294,14 +3294,6 @@
           <a:p/>
           <a:p>
             <a:pPr algn="l">
-              <a:defRPr b="1" sz="1800"/>
-            </a:pPr>
-            <a:r>
-              <a:t>[Ref: Robbins Basic Pathology/10th/P-117] </a:t>
-            </a:r>
-          </a:p>
-          <a:p>
-            <a:pPr algn="l">
               <a:defRPr sz="1800"/>
             </a:pPr>
             <a:r>
@@ -3345,14 +3337,6 @@
           <a:p/>
           <a:p>
             <a:pPr algn="l">
-              <a:defRPr b="1" sz="1800"/>
-            </a:pPr>
-            <a:r>
-              <a:t>[Ref: Robbins Basic Pathology/10th/P-53] </a:t>
-            </a:r>
-          </a:p>
-          <a:p>
-            <a:pPr algn="l">
               <a:defRPr sz="1800"/>
             </a:pPr>
             <a:r>
@@ -3446,7 +3430,7 @@
               <a:defRPr b="1" sz="1800"/>
             </a:pPr>
             <a:r>
-              <a:t>Ans: TTTTT</a:t>
+              <a:t>Ans: TTTTT [Ref: Robbins Basic Pathology/10th/P-103] </a:t>
             </a:r>
           </a:p>
         </p:txBody>
@@ -3486,14 +3470,6 @@
           <a:p/>
           <a:p>
             <a:pPr algn="l">
-              <a:defRPr b="1" sz="1800"/>
-            </a:pPr>
-            <a:r>
-              <a:t>[Ref: Robbins Basic Pathology/10th/P-103] </a:t>
-            </a:r>
-          </a:p>
-          <a:p>
-            <a:pPr algn="l">
               <a:defRPr sz="1800"/>
             </a:pPr>
             <a:r>
@@ -3587,7 +3563,7 @@
               <a:defRPr b="1" sz="1800"/>
             </a:pPr>
             <a:r>
-              <a:t>Ans: TFTTF</a:t>
+              <a:t>Ans: TFTTF [Ref: Robbins Basic Pathology/10th/P-137] </a:t>
             </a:r>
           </a:p>
         </p:txBody>
@@ -3627,14 +3603,6 @@
           <a:p/>
           <a:p>
             <a:pPr algn="l">
-              <a:defRPr b="1" sz="1800"/>
-            </a:pPr>
-            <a:r>
-              <a:t>[Ref: Robbins Basic Pathology/10th/P-137] </a:t>
-            </a:r>
-          </a:p>
-          <a:p>
-            <a:pPr algn="l">
               <a:defRPr sz="1800"/>
             </a:pPr>
             <a:r>
@@ -3728,7 +3696,7 @@
               <a:defRPr b="1" sz="1800"/>
             </a:pPr>
             <a:r>
-              <a:t>Ans: TTFFF</a:t>
+              <a:t>Ans: TTFFF [Ref: Robbins Basic Pathology/10th/P-98] </a:t>
             </a:r>
           </a:p>
         </p:txBody>
@@ -3768,14 +3736,6 @@
           <a:p/>
           <a:p>
             <a:pPr algn="l">
-              <a:defRPr b="1" sz="1800"/>
-            </a:pPr>
-            <a:r>
-              <a:t>[Ref: Robbins Basic Pathology/10th/P-98] </a:t>
-            </a:r>
-          </a:p>
-          <a:p>
-            <a:pPr algn="l">
               <a:defRPr sz="1800"/>
             </a:pPr>
             <a:r>
@@ -3786,7 +3746,7 @@
       </p:sp>
       <p:pic>
         <p:nvPicPr>
-          <p:cNvPr id="4" name="Picture 3" descr="hbRzZoqYbt.jpg"/>
+          <p:cNvPr id="4" name="Picture 3" descr="bhTcmbwIeN.jpg"/>
           <p:cNvPicPr>
             <a:picLocks noChangeAspect="1"/>
           </p:cNvPicPr>
@@ -3893,7 +3853,7 @@
               <a:defRPr b="1" sz="1800"/>
             </a:pPr>
             <a:r>
-              <a:t>Ans: FTFTF</a:t>
+              <a:t>Ans: FTFTF [Ref: Robbins Basic Pathology/10th/P-100] [Ref: Robbins Basic Pathology/10th/P-101] </a:t>
             </a:r>
           </a:p>
         </p:txBody>
@@ -3933,14 +3893,6 @@
           <a:p/>
           <a:p>
             <a:pPr algn="l">
-              <a:defRPr b="1" sz="1800"/>
-            </a:pPr>
-            <a:r>
-              <a:t>[Ref: Robbins Basic Pathology/10th/P-100] [Ref: Robbins Basic Pathology/10th/P-101] </a:t>
-            </a:r>
-          </a:p>
-          <a:p>
-            <a:pPr algn="l">
               <a:defRPr sz="1800"/>
             </a:pPr>
             <a:r>
@@ -4034,7 +3986,7 @@
               <a:defRPr b="1" sz="1800"/>
             </a:pPr>
             <a:r>
-              <a:t>Ans: TTFTF</a:t>
+              <a:t>Ans: TTFTF </a:t>
             </a:r>
           </a:p>
         </p:txBody>
@@ -4074,14 +4026,6 @@
           <a:p/>
           <a:p>
             <a:pPr algn="l">
-              <a:defRPr b="1" sz="1800"/>
-            </a:pPr>
-            <a:r>
-              <a:t>[Ref: Robbins Basic Pathology/10th/P-93] </a:t>
-            </a:r>
-          </a:p>
-          <a:p>
-            <a:pPr algn="l">
               <a:defRPr sz="1800"/>
             </a:pPr>
             <a:r>
@@ -4125,6 +4069,11 @@
           <a:p/>
           <a:p>
             <a:pPr algn="l">
+              <a:defRPr b="1" sz="1800"/>
+            </a:pPr>
+          </a:p>
+          <a:p>
+            <a:pPr algn="l">
               <a:defRPr sz="1800"/>
             </a:pPr>
             <a:r>
@@ -4218,7 +4167,7 @@
               <a:defRPr b="1" sz="1800"/>
             </a:pPr>
             <a:r>
-              <a:t>Ans: TFTFF</a:t>
+              <a:t>Ans: TFTFF </a:t>
             </a:r>
           </a:p>
         </p:txBody>
@@ -4258,6 +4207,11 @@
           <a:p/>
           <a:p>
             <a:pPr algn="l">
+              <a:defRPr b="1" sz="1800"/>
+            </a:pPr>
+          </a:p>
+          <a:p>
+            <a:pPr algn="l">
               <a:defRPr sz="1800"/>
             </a:pPr>
             <a:r>
@@ -4351,7 +4305,7 @@
               <a:defRPr b="1" sz="1800"/>
             </a:pPr>
             <a:r>
-              <a:t>Ans: TTFTF</a:t>
+              <a:t>Ans: TTFTF [Ref: Robbins Basic Pathology/10th/P-92] </a:t>
             </a:r>
           </a:p>
         </p:txBody>
@@ -4391,14 +4345,6 @@
           <a:p/>
           <a:p>
             <a:pPr algn="l">
-              <a:defRPr b="1" sz="1800"/>
-            </a:pPr>
-            <a:r>
-              <a:t>[Ref: Robbins Basic Pathology/10th/P-92] </a:t>
-            </a:r>
-          </a:p>
-          <a:p>
-            <a:pPr algn="l">
               <a:defRPr sz="1800"/>
             </a:pPr>
             <a:r>
@@ -4492,7 +4438,7 @@
               <a:defRPr b="1" sz="1800"/>
             </a:pPr>
             <a:r>
-              <a:t>Ans: TTFFT</a:t>
+              <a:t>Ans: TTFFT [Ref: Robbins Basic Pathology/10th/P-193] </a:t>
             </a:r>
           </a:p>
         </p:txBody>
@@ -4532,14 +4478,6 @@
           <a:p/>
           <a:p>
             <a:pPr algn="l">
-              <a:defRPr b="1" sz="1800"/>
-            </a:pPr>
-            <a:r>
-              <a:t>[Ref: Robbins Basic Pathology/10th/P-193] </a:t>
-            </a:r>
-          </a:p>
-          <a:p>
-            <a:pPr algn="l">
               <a:defRPr sz="1800"/>
             </a:pPr>
             <a:r>
@@ -4633,7 +4571,7 @@
               <a:defRPr b="1" sz="1800"/>
             </a:pPr>
             <a:r>
-              <a:t>Ans: FFTTF</a:t>
+              <a:t>Ans: FFTTF [Ref: Robbins Basic Pathology/10th/P-329] </a:t>
             </a:r>
           </a:p>
         </p:txBody>
@@ -4673,14 +4611,6 @@
           <a:p/>
           <a:p>
             <a:pPr algn="l">
-              <a:defRPr b="1" sz="1800"/>
-            </a:pPr>
-            <a:r>
-              <a:t>[Ref: Robbins Basic Pathology/10th/P-329] </a:t>
-            </a:r>
-          </a:p>
-          <a:p>
-            <a:pPr algn="l">
               <a:defRPr sz="1800"/>
             </a:pPr>
             <a:r>
@@ -4774,7 +4704,7 @@
               <a:defRPr b="1" sz="1800"/>
             </a:pPr>
             <a:r>
-              <a:t>Ans: TTFTT</a:t>
+              <a:t>Ans: TTFTT [Ref: Robbins Basic Pathology/10th/P-238] </a:t>
             </a:r>
           </a:p>
         </p:txBody>
@@ -4864,7 +4794,7 @@
               <a:defRPr b="1" sz="1800"/>
             </a:pPr>
             <a:r>
-              <a:t>Ans: TFTFT</a:t>
+              <a:t>Ans: TFTFT [Ref: Robbins Basic Pathology/10th/P-126] </a:t>
             </a:r>
           </a:p>
         </p:txBody>
@@ -4904,14 +4834,6 @@
           <a:p/>
           <a:p>
             <a:pPr algn="l">
-              <a:defRPr b="1" sz="1800"/>
-            </a:pPr>
-            <a:r>
-              <a:t>[Ref: Robbins Basic Pathology/10th/P-238] </a:t>
-            </a:r>
-          </a:p>
-          <a:p>
-            <a:pPr algn="l">
               <a:defRPr sz="1800"/>
             </a:pPr>
             <a:r>
@@ -5005,7 +4927,7 @@
               <a:defRPr b="1" sz="1800"/>
             </a:pPr>
             <a:r>
-              <a:t>Ans: TFTTF</a:t>
+              <a:t>Ans: TFTTF [Ref: Robbins Basic Pathology/10th/P-238] </a:t>
             </a:r>
           </a:p>
         </p:txBody>
@@ -5045,14 +4967,6 @@
           <a:p/>
           <a:p>
             <a:pPr algn="l">
-              <a:defRPr b="1" sz="1800"/>
-            </a:pPr>
-            <a:r>
-              <a:t>[Ref: Robbins Basic Pathology/10th/P-238] </a:t>
-            </a:r>
-          </a:p>
-          <a:p>
-            <a:pPr algn="l">
               <a:defRPr sz="1800"/>
             </a:pPr>
             <a:r>
@@ -5146,7 +5060,7 @@
               <a:defRPr b="1" sz="1800"/>
             </a:pPr>
             <a:r>
-              <a:t>Ans: FTTTF</a:t>
+              <a:t>Ans: FTTTF </a:t>
             </a:r>
           </a:p>
         </p:txBody>
@@ -5186,6 +5100,11 @@
           <a:p/>
           <a:p>
             <a:pPr algn="l">
+              <a:defRPr b="1" sz="1800"/>
+            </a:pPr>
+          </a:p>
+          <a:p>
+            <a:pPr algn="l">
               <a:defRPr sz="1800"/>
             </a:pPr>
             <a:r>
@@ -5279,7 +5198,7 @@
               <a:defRPr b="1" sz="1800"/>
             </a:pPr>
             <a:r>
-              <a:t>Ans: TFTFT</a:t>
+              <a:t>Ans: TFTFT [Ref: Robbins Basic Pathology/10th/P-40] </a:t>
             </a:r>
           </a:p>
         </p:txBody>
@@ -5319,14 +5238,6 @@
           <a:p/>
           <a:p>
             <a:pPr algn="l">
-              <a:defRPr b="1" sz="1800"/>
-            </a:pPr>
-            <a:r>
-              <a:t>[Ref: Robbins Basic Pathology/10th/P-40] </a:t>
-            </a:r>
-          </a:p>
-          <a:p>
-            <a:pPr algn="l">
               <a:defRPr sz="1800"/>
             </a:pPr>
             <a:r>
@@ -5420,7 +5331,7 @@
               <a:defRPr b="1" sz="1800"/>
             </a:pPr>
             <a:r>
-              <a:t>Ans: TTFFT</a:t>
+              <a:t>Ans: TTFFT [Ref: Robbins Basic Pathology/10th/P-66] [Ref: Robbins Basic Pathology/10th/P-68] </a:t>
             </a:r>
           </a:p>
         </p:txBody>
@@ -5460,14 +5371,6 @@
           <a:p/>
           <a:p>
             <a:pPr algn="l">
-              <a:defRPr b="1" sz="1800"/>
-            </a:pPr>
-            <a:r>
-              <a:t>[Ref: Robbins Basic Pathology/10th/P-66] [Ref: Robbins Basic Pathology/10th/P-68] </a:t>
-            </a:r>
-          </a:p>
-          <a:p>
-            <a:pPr algn="l">
               <a:defRPr sz="1800"/>
             </a:pPr>
             <a:r>
@@ -5561,7 +5464,7 @@
               <a:defRPr b="1" sz="1800"/>
             </a:pPr>
             <a:r>
-              <a:t>Ans: TTFTF</a:t>
+              <a:t>Ans: TTFTF [Ref: Robbins Basic Pathology/10th/P-65] [Ref: Robbins Basic Pathology/10th/P-690] </a:t>
             </a:r>
           </a:p>
         </p:txBody>
@@ -5600,14 +5503,6 @@
           <a:lstStyle/>
           <a:p/>
           <a:p>
-            <a:pPr algn="l">
-              <a:defRPr b="1" sz="1800"/>
-            </a:pPr>
-            <a:r>
-              <a:t>[Ref: Robbins Basic Pathology/10th/P-126] </a:t>
-            </a:r>
-          </a:p>
-          <a:p>
             <a:br/>
             <a:br/>
             <a:pPr algn="l">
@@ -5621,7 +5516,7 @@
       </p:sp>
       <p:pic>
         <p:nvPicPr>
-          <p:cNvPr id="4" name="Picture 3" descr="TyDILNPYVl.jpg"/>
+          <p:cNvPr id="4" name="Picture 3" descr="HYkffacnNJ.jpg"/>
           <p:cNvPicPr>
             <a:picLocks noChangeAspect="1"/>
           </p:cNvPicPr>
@@ -5678,14 +5573,6 @@
           <a:p/>
           <a:p>
             <a:pPr algn="l">
-              <a:defRPr b="1" sz="1800"/>
-            </a:pPr>
-            <a:r>
-              <a:t>[Ref: Robbins Basic Pathology/10th/P-65] [Ref: Robbins Basic Pathology/10th/P-690] </a:t>
-            </a:r>
-          </a:p>
-          <a:p>
-            <a:pPr algn="l">
               <a:defRPr sz="1800"/>
             </a:pPr>
             <a:r>
@@ -5779,7 +5666,7 @@
               <a:defRPr b="1" sz="1800"/>
             </a:pPr>
             <a:r>
-              <a:t>Ans: TFFTT</a:t>
+              <a:t>Ans: TFFTT </a:t>
             </a:r>
           </a:p>
         </p:txBody>
@@ -5819,6 +5706,11 @@
           <a:p/>
           <a:p>
             <a:pPr algn="l">
+              <a:defRPr b="1" sz="1800"/>
+            </a:pPr>
+          </a:p>
+          <a:p>
+            <a:pPr algn="l">
               <a:defRPr sz="1800"/>
             </a:pPr>
             <a:r>
@@ -5947,7 +5839,7 @@
               <a:defRPr b="1" sz="1800"/>
             </a:pPr>
             <a:r>
-              <a:t>Ans: TTFFF</a:t>
+              <a:t>Ans: TTFFF </a:t>
             </a:r>
           </a:p>
         </p:txBody>
@@ -5987,6 +5879,11 @@
           <a:p/>
           <a:p>
             <a:pPr algn="l">
+              <a:defRPr b="1" sz="1800"/>
+            </a:pPr>
+          </a:p>
+          <a:p>
+            <a:pPr algn="l">
               <a:defRPr sz="1800"/>
             </a:pPr>
             <a:r>
@@ -6080,7 +5977,7 @@
               <a:defRPr b="1" sz="1800"/>
             </a:pPr>
             <a:r>
-              <a:t>Ans: TFFTT</a:t>
+              <a:t>Ans: TFFTT [Ref: Robbins Basic Pathology/10th/P-56] </a:t>
             </a:r>
           </a:p>
         </p:txBody>
@@ -6120,14 +6017,6 @@
           <a:p/>
           <a:p>
             <a:pPr algn="l">
-              <a:defRPr b="1" sz="1800"/>
-            </a:pPr>
-            <a:r>
-              <a:t>[Ref: Robbins Basic Pathology/10th/P-56] </a:t>
-            </a:r>
-          </a:p>
-          <a:p>
-            <a:pPr algn="l">
               <a:defRPr sz="1800"/>
             </a:pPr>
             <a:r>
@@ -6221,7 +6110,7 @@
               <a:defRPr b="1" sz="1800"/>
             </a:pPr>
             <a:r>
-              <a:t>Ans: TTFFT</a:t>
+              <a:t>Ans: TTFFT [Ref: Robbins Basic Pathology/10th/P-40] </a:t>
             </a:r>
           </a:p>
         </p:txBody>
@@ -6261,14 +6150,6 @@
           <a:p/>
           <a:p>
             <a:pPr algn="l">
-              <a:defRPr b="1" sz="1800"/>
-            </a:pPr>
-            <a:r>
-              <a:t>[Ref: Robbins Basic Pathology/10th/P-40] </a:t>
-            </a:r>
-          </a:p>
-          <a:p>
-            <a:pPr algn="l">
               <a:defRPr sz="1800"/>
             </a:pPr>
             <a:r>
@@ -6362,7 +6243,7 @@
               <a:defRPr b="1" sz="1800"/>
             </a:pPr>
             <a:r>
-              <a:t>Ans: FTFTF</a:t>
+              <a:t>Ans: FTFTF [Ref: Robbins Basic Pathology/10th/P-565] </a:t>
             </a:r>
           </a:p>
         </p:txBody>
@@ -6452,7 +6333,7 @@
               <a:defRPr b="1" sz="1800"/>
             </a:pPr>
             <a:r>
-              <a:t>Ans: TTFTF</a:t>
+              <a:t>Ans: TTFTF [Ref: Khurana/3rd/P-38] </a:t>
             </a:r>
           </a:p>
         </p:txBody>
@@ -6492,14 +6373,6 @@
           <a:p/>
           <a:p>
             <a:pPr algn="l">
-              <a:defRPr b="1" sz="1800"/>
-            </a:pPr>
-            <a:r>
-              <a:t>[Ref: Robbins Basic Pathology/10th/P-565] </a:t>
-            </a:r>
-          </a:p>
-          <a:p>
-            <a:pPr algn="l">
               <a:defRPr sz="1800"/>
             </a:pPr>
             <a:r>
@@ -6593,7 +6466,7 @@
               <a:defRPr b="1" sz="1800"/>
             </a:pPr>
             <a:r>
-              <a:t>Ans: C</a:t>
+              <a:t>Ans: C [Ref: Robbins Basic Pathology/10th/P-104] </a:t>
             </a:r>
           </a:p>
         </p:txBody>
@@ -6633,14 +6506,6 @@
           <a:p/>
           <a:p>
             <a:pPr algn="l">
-              <a:defRPr b="1" sz="1800"/>
-            </a:pPr>
-            <a:r>
-              <a:t>[Ref: Robbins Basic Pathology/10th/P-104] </a:t>
-            </a:r>
-          </a:p>
-          <a:p>
-            <a:pPr algn="l">
               <a:defRPr sz="1800"/>
             </a:pPr>
             <a:r>
@@ -6739,7 +6604,7 @@
               <a:defRPr b="1" sz="1800"/>
             </a:pPr>
             <a:r>
-              <a:t>Ans: A</a:t>
+              <a:t>Ans: A [Ref: Robbins Basic Pathology/10th/P-89] </a:t>
             </a:r>
           </a:p>
         </p:txBody>
@@ -6779,14 +6644,6 @@
           <a:p/>
           <a:p>
             <a:pPr algn="l">
-              <a:defRPr b="1" sz="1800"/>
-            </a:pPr>
-            <a:r>
-              <a:t>[Ref: Robbins Basic Pathology/10th/P-89] </a:t>
-            </a:r>
-          </a:p>
-          <a:p>
-            <a:pPr algn="l">
               <a:defRPr sz="1800"/>
             </a:pPr>
             <a:r>
@@ -6880,7 +6737,7 @@
               <a:defRPr b="1" sz="1800"/>
             </a:pPr>
             <a:r>
-              <a:t>Ans: D</a:t>
+              <a:t>Ans: D [Ref: Robbins Basic Pathology/10th/P-99] </a:t>
             </a:r>
           </a:p>
         </p:txBody>
@@ -6920,14 +6777,6 @@
           <a:p/>
           <a:p>
             <a:pPr algn="l">
-              <a:defRPr b="1" sz="1800"/>
-            </a:pPr>
-            <a:r>
-              <a:t>[Ref: Robbins Basic Pathology/10th/P-99] </a:t>
-            </a:r>
-          </a:p>
-          <a:p>
-            <a:pPr algn="l">
               <a:defRPr sz="1800"/>
             </a:pPr>
             <a:r>
@@ -7021,7 +6870,7 @@
               <a:defRPr b="1" sz="1800"/>
             </a:pPr>
             <a:r>
-              <a:t>Ans: B</a:t>
+              <a:t>Ans: B </a:t>
             </a:r>
           </a:p>
         </p:txBody>
@@ -7061,6 +6910,11 @@
           <a:p/>
           <a:p>
             <a:pPr algn="l">
+              <a:defRPr b="1" sz="1800"/>
+            </a:pPr>
+          </a:p>
+          <a:p>
+            <a:pPr algn="l">
               <a:defRPr sz="1800"/>
             </a:pPr>
             <a:r>
@@ -7154,7 +7008,7 @@
               <a:defRPr b="1" sz="1800"/>
             </a:pPr>
             <a:r>
-              <a:t>Ans: A</a:t>
+              <a:t>Ans: A [Ref: Robbins Basic Pathology/10th/P-111] </a:t>
             </a:r>
           </a:p>
         </p:txBody>
@@ -7194,14 +7048,6 @@
           <a:p/>
           <a:p>
             <a:pPr algn="l">
-              <a:defRPr b="1" sz="1800"/>
-            </a:pPr>
-            <a:r>
-              <a:t>[Ref: Khurana/3rd/P-38] </a:t>
-            </a:r>
-          </a:p>
-          <a:p>
-            <a:pPr algn="l">
               <a:defRPr sz="1800"/>
             </a:pPr>
             <a:r>
@@ -7245,14 +7091,6 @@
           <a:p/>
           <a:p>
             <a:pPr algn="l">
-              <a:defRPr b="1" sz="1800"/>
-            </a:pPr>
-            <a:r>
-              <a:t>[Ref: Robbins Basic Pathology/10th/P-111] </a:t>
-            </a:r>
-          </a:p>
-          <a:p>
-            <a:pPr algn="l">
               <a:defRPr sz="1800"/>
             </a:pPr>
             <a:r>
@@ -7353,7 +7191,7 @@
               <a:defRPr b="1" sz="1800"/>
             </a:pPr>
             <a:r>
-              <a:t>Ans: C</a:t>
+              <a:t>Ans: C [Ref: Robbins Basic Pathology/10th/P-487] </a:t>
             </a:r>
           </a:p>
         </p:txBody>
@@ -7393,14 +7231,6 @@
           <a:p/>
           <a:p>
             <a:pPr algn="l">
-              <a:defRPr b="1" sz="1800"/>
-            </a:pPr>
-            <a:r>
-              <a:t>[Ref: Robbins Basic Pathology/10th/P-487] </a:t>
-            </a:r>
-          </a:p>
-          <a:p>
-            <a:pPr algn="l">
               <a:defRPr sz="1800"/>
             </a:pPr>
             <a:r>
@@ -7494,7 +7324,7 @@
               <a:defRPr b="1" sz="1800"/>
             </a:pPr>
             <a:r>
-              <a:t>Ans: E</a:t>
+              <a:t>Ans: E </a:t>
             </a:r>
           </a:p>
         </p:txBody>
@@ -7534,6 +7364,11 @@
           <a:p/>
           <a:p>
             <a:pPr algn="l">
+              <a:defRPr b="1" sz="1800"/>
+            </a:pPr>
+          </a:p>
+          <a:p>
+            <a:pPr algn="l">
               <a:defRPr sz="1800"/>
             </a:pPr>
             <a:r>
@@ -7627,7 +7462,7 @@
               <a:defRPr b="1" sz="1800"/>
             </a:pPr>
             <a:r>
-              <a:t>Ans: C</a:t>
+              <a:t>Ans: C [Ref: Robbins Basic Pathology/10th/P-93] </a:t>
             </a:r>
           </a:p>
         </p:txBody>
@@ -7667,14 +7502,6 @@
           <a:p/>
           <a:p>
             <a:pPr algn="l">
-              <a:defRPr b="1" sz="1800"/>
-            </a:pPr>
-            <a:r>
-              <a:t>[Ref: Robbins Basic Pathology/10th/P-93] </a:t>
-            </a:r>
-          </a:p>
-          <a:p>
-            <a:pPr algn="l">
               <a:defRPr sz="1800"/>
             </a:pPr>
             <a:r>
@@ -7773,7 +7600,7 @@
               <a:defRPr b="1" sz="1800"/>
             </a:pPr>
             <a:r>
-              <a:t>Ans: B</a:t>
+              <a:t>Ans: B [Ref: BRS Pathology/6th/P-44] [Ref: Robbins Basic Pathology/10th/P-116] </a:t>
             </a:r>
           </a:p>
         </p:txBody>
@@ -7813,14 +7640,6 @@
           <a:p/>
           <a:p>
             <a:pPr algn="l">
-              <a:defRPr b="1" sz="1800"/>
-            </a:pPr>
-            <a:r>
-              <a:t>[Ref: BRS Pathology/6th/P-44] [Ref: Robbins Basic Pathology/10th/P-116] </a:t>
-            </a:r>
-          </a:p>
-          <a:p>
-            <a:pPr algn="l">
               <a:defRPr sz="1800"/>
             </a:pPr>
             <a:r>
@@ -7914,7 +7733,7 @@
               <a:defRPr b="1" sz="1800"/>
             </a:pPr>
             <a:r>
-              <a:t>Ans: E</a:t>
+              <a:t>Ans: E [Ref: Robbins Basic Pathology/10th/P-105] </a:t>
             </a:r>
           </a:p>
         </p:txBody>
@@ -8004,7 +7823,7 @@
               <a:defRPr b="1" sz="1800"/>
             </a:pPr>
             <a:r>
-              <a:t>Ans: FTFTT</a:t>
+              <a:t>Ans: FTFTT [Ref: Robbins Basic Pathology/10th/P-112] </a:t>
             </a:r>
           </a:p>
         </p:txBody>
@@ -8044,14 +7863,6 @@
           <a:p/>
           <a:p>
             <a:pPr algn="l">
-              <a:defRPr b="1" sz="1800"/>
-            </a:pPr>
-            <a:r>
-              <a:t>[Ref: Robbins Basic Pathology/10th/P-105] </a:t>
-            </a:r>
-          </a:p>
-          <a:p>
-            <a:pPr algn="l">
               <a:defRPr sz="1800"/>
             </a:pPr>
             <a:r>
@@ -8145,7 +7956,7 @@
               <a:defRPr b="1" sz="1800"/>
             </a:pPr>
             <a:r>
-              <a:t>Ans: D</a:t>
+              <a:t>Ans: D [Ref: Khaleque Pathology/3rd/P-43] </a:t>
             </a:r>
           </a:p>
         </p:txBody>
@@ -8185,14 +7996,6 @@
           <a:p/>
           <a:p>
             <a:pPr algn="l">
-              <a:defRPr b="1" sz="1800"/>
-            </a:pPr>
-            <a:r>
-              <a:t>[Ref: Khaleque Pathology/3rd/P-43] </a:t>
-            </a:r>
-          </a:p>
-          <a:p>
-            <a:pPr algn="l">
               <a:defRPr sz="1800"/>
             </a:pPr>
             <a:r>
@@ -8286,7 +8089,7 @@
               <a:defRPr b="1" sz="1800"/>
             </a:pPr>
             <a:r>
-              <a:t>Ans: C</a:t>
+              <a:t>Ans: C [Ref: Robbins Basic Pathology/10th/P-133] </a:t>
             </a:r>
           </a:p>
         </p:txBody>
@@ -8326,14 +8129,6 @@
           <a:p/>
           <a:p>
             <a:pPr algn="l">
-              <a:defRPr b="1" sz="1800"/>
-            </a:pPr>
-            <a:r>
-              <a:t>[Ref: Robbins Basic Pathology/10th/P-133] </a:t>
-            </a:r>
-          </a:p>
-          <a:p>
-            <a:pPr algn="l">
               <a:defRPr sz="1800"/>
             </a:pPr>
             <a:r>
@@ -8344,7 +8139,7 @@
       </p:sp>
       <p:pic>
         <p:nvPicPr>
-          <p:cNvPr id="4" name="Picture 3" descr="jPLVSoSlRw.jpg"/>
+          <p:cNvPr id="4" name="Picture 3" descr="dQQIsqxQVB.jpg"/>
           <p:cNvPicPr>
             <a:picLocks noChangeAspect="1"/>
           </p:cNvPicPr>
@@ -8451,7 +8246,7 @@
               <a:defRPr b="1" sz="1800"/>
             </a:pPr>
             <a:r>
-              <a:t>Ans: A</a:t>
+              <a:t>Ans: A [Ref: Khaleque Pathology/3rd/P-53] [Ref: BRS Pathology/6th/P-88] </a:t>
             </a:r>
           </a:p>
         </p:txBody>
@@ -8491,14 +8286,6 @@
           <a:p/>
           <a:p>
             <a:pPr algn="l">
-              <a:defRPr b="1" sz="1800"/>
-            </a:pPr>
-            <a:r>
-              <a:t>[Ref: Khaleque Pathology/3rd/P-53] [Ref: BRS Pathology/6th/P-88] </a:t>
-            </a:r>
-          </a:p>
-          <a:p>
-            <a:pPr algn="l">
               <a:defRPr sz="1800"/>
             </a:pPr>
             <a:r>
@@ -8597,7 +8384,7 @@
               <a:defRPr b="1" sz="1800"/>
             </a:pPr>
             <a:r>
-              <a:t>Ans: B</a:t>
+              <a:t>Ans: B [Ref: Bailey &amp; Love’s/28th/P-1315] [Ref: Roddie Physiology/6th/P-819] </a:t>
             </a:r>
           </a:p>
         </p:txBody>
@@ -8637,14 +8424,6 @@
           <a:p/>
           <a:p>
             <a:pPr algn="l">
-              <a:defRPr b="1" sz="1800"/>
-            </a:pPr>
-            <a:r>
-              <a:t>[Ref: Bailey &amp; Love’s/28th/P-1315] [Ref: Roddie Physiology/6th/P-819] </a:t>
-            </a:r>
-          </a:p>
-          <a:p>
-            <a:pPr algn="l">
               <a:defRPr sz="1800"/>
             </a:pPr>
             <a:r>
@@ -8738,7 +8517,7 @@
               <a:defRPr b="1" sz="1800"/>
             </a:pPr>
             <a:r>
-              <a:t>Ans: E</a:t>
+              <a:t>Ans: E [Ref: Robbins Basic Pathology/10th/P-133] </a:t>
             </a:r>
           </a:p>
         </p:txBody>
@@ -8778,14 +8557,6 @@
           <a:p/>
           <a:p>
             <a:pPr algn="l">
-              <a:defRPr b="1" sz="1800"/>
-            </a:pPr>
-            <a:r>
-              <a:t>[Ref: Robbins Basic Pathology/10th/P-112] </a:t>
-            </a:r>
-          </a:p>
-          <a:p>
-            <a:pPr algn="l">
               <a:defRPr sz="1800"/>
             </a:pPr>
             <a:r>
@@ -8829,14 +8600,6 @@
           <a:p/>
           <a:p>
             <a:pPr algn="l">
-              <a:defRPr b="1" sz="1800"/>
-            </a:pPr>
-            <a:r>
-              <a:t>[Ref: Robbins Basic Pathology/10th/P-133] </a:t>
-            </a:r>
-          </a:p>
-          <a:p>
-            <a:pPr algn="l">
               <a:defRPr sz="1800"/>
             </a:pPr>
             <a:r>
@@ -8930,7 +8693,7 @@
               <a:defRPr b="1" sz="1800"/>
             </a:pPr>
             <a:r>
-              <a:t>Ans: C</a:t>
+              <a:t>Ans: C [Ref: Robbins Basic Pathology/10th/P-199] </a:t>
             </a:r>
           </a:p>
         </p:txBody>
@@ -8970,14 +8733,6 @@
           <a:p/>
           <a:p>
             <a:pPr algn="l">
-              <a:defRPr b="1" sz="1800"/>
-            </a:pPr>
-            <a:r>
-              <a:t>[Ref: Robbins Basic Pathology/10th/P-199] </a:t>
-            </a:r>
-          </a:p>
-          <a:p>
-            <a:pPr algn="l">
               <a:defRPr sz="1800"/>
             </a:pPr>
             <a:r>
@@ -9071,7 +8826,7 @@
               <a:defRPr b="1" sz="1800"/>
             </a:pPr>
             <a:r>
-              <a:t>Ans: D</a:t>
+              <a:t>Ans: D [Ref: Robbins Basic Pathology/10th/P-272] </a:t>
             </a:r>
           </a:p>
         </p:txBody>
@@ -9111,14 +8866,6 @@
           <a:p/>
           <a:p>
             <a:pPr algn="l">
-              <a:defRPr b="1" sz="1800"/>
-            </a:pPr>
-            <a:r>
-              <a:t>[Ref: Robbins Basic Pathology/10th/P-272] </a:t>
-            </a:r>
-          </a:p>
-          <a:p>
-            <a:pPr algn="l">
               <a:defRPr sz="1800"/>
             </a:pPr>
             <a:r>
@@ -9212,7 +8959,7 @@
               <a:defRPr b="1" sz="1800"/>
             </a:pPr>
             <a:r>
-              <a:t>Ans: C</a:t>
+              <a:t>Ans: C [Ref: Robbins Basic Pathology/10th/P-336] </a:t>
             </a:r>
           </a:p>
         </p:txBody>
@@ -9252,14 +8999,6 @@
           <a:p/>
           <a:p>
             <a:pPr algn="l">
-              <a:defRPr b="1" sz="1800"/>
-            </a:pPr>
-            <a:r>
-              <a:t>[Ref: Robbins Basic Pathology/10th/P-336] </a:t>
-            </a:r>
-          </a:p>
-          <a:p>
-            <a:pPr algn="l">
               <a:defRPr sz="1800"/>
             </a:pPr>
             <a:r>
@@ -9353,7 +9092,7 @@
               <a:defRPr b="1" sz="1800"/>
             </a:pPr>
             <a:r>
-              <a:t>Ans: E</a:t>
+              <a:t>Ans: E [Ref: Robbins Basic Pathology/10th/P-61] [Ref: Khaleque Pathology/3rd/P-2] </a:t>
             </a:r>
           </a:p>
         </p:txBody>
@@ -9393,14 +9132,6 @@
           <a:p/>
           <a:p>
             <a:pPr algn="l">
-              <a:defRPr b="1" sz="1800"/>
-            </a:pPr>
-            <a:r>
-              <a:t>[Ref: Robbins Basic Pathology/10th/P-61] [Ref: Khaleque Pathology/3rd/P-2] </a:t>
-            </a:r>
-          </a:p>
-          <a:p>
-            <a:pPr algn="l">
               <a:defRPr sz="1800"/>
             </a:pPr>
             <a:r>
@@ -9494,7 +9225,7 @@
               <a:defRPr b="1" sz="1800"/>
             </a:pPr>
             <a:r>
-              <a:t>Ans: D</a:t>
+              <a:t>Ans: D [Ref: Robbins Basic Pathology/10th/P-59] </a:t>
             </a:r>
           </a:p>
         </p:txBody>
@@ -9584,7 +9315,7 @@
               <a:defRPr b="1" sz="1800"/>
             </a:pPr>
             <a:r>
-              <a:t>Ans: TTTTT</a:t>
+              <a:t>Ans: TTTTT [Ref: Robbins Basic Pathology/10th/P-117] </a:t>
             </a:r>
           </a:p>
         </p:txBody>
@@ -9624,14 +9355,6 @@
           <a:p/>
           <a:p>
             <a:pPr algn="l">
-              <a:defRPr b="1" sz="1800"/>
-            </a:pPr>
-            <a:r>
-              <a:t>[Ref: Robbins Basic Pathology/10th/P-59] </a:t>
-            </a:r>
-          </a:p>
-          <a:p>
-            <a:pPr algn="l">
               <a:defRPr sz="1800"/>
             </a:pPr>
             <a:r>
@@ -9725,7 +9448,7 @@
               <a:defRPr b="1" sz="1800"/>
             </a:pPr>
             <a:r>
-              <a:t>Ans: C</a:t>
+              <a:t>Ans: C [Ref: Robbins Basic Pathology/10th/P-66] </a:t>
             </a:r>
           </a:p>
         </p:txBody>
@@ -9765,14 +9488,6 @@
           <a:p/>
           <a:p>
             <a:pPr algn="l">
-              <a:defRPr b="1" sz="1800"/>
-            </a:pPr>
-            <a:r>
-              <a:t>[Ref: Robbins Basic Pathology/10th/P-66] </a:t>
-            </a:r>
-          </a:p>
-          <a:p>
-            <a:pPr algn="l">
               <a:defRPr sz="1800"/>
             </a:pPr>
             <a:r>
@@ -9866,7 +9581,7 @@
               <a:defRPr b="1" sz="1800"/>
             </a:pPr>
             <a:r>
-              <a:t>Ans: B</a:t>
+              <a:t>Ans: B [Ref: Robbins Basic Pathology/10th/P-43] </a:t>
             </a:r>
           </a:p>
         </p:txBody>
@@ -9906,14 +9621,6 @@
           <a:p/>
           <a:p>
             <a:pPr algn="l">
-              <a:defRPr b="1" sz="1800"/>
-            </a:pPr>
-            <a:r>
-              <a:t>[Ref: Robbins Basic Pathology/10th/P-43] </a:t>
-            </a:r>
-          </a:p>
-          <a:p>
-            <a:pPr algn="l">
               <a:defRPr sz="1800"/>
             </a:pPr>
             <a:r>
@@ -10007,7 +9714,7 @@
               <a:defRPr b="1" sz="1800"/>
             </a:pPr>
             <a:r>
-              <a:t>Ans: D</a:t>
+              <a:t>Ans: D [Ref: Robbins Basic Pathology/10th/P-35] </a:t>
             </a:r>
           </a:p>
         </p:txBody>
@@ -10047,14 +9754,6 @@
           <a:p/>
           <a:p>
             <a:pPr algn="l">
-              <a:defRPr b="1" sz="1800"/>
-            </a:pPr>
-            <a:r>
-              <a:t>[Ref: Robbins Basic Pathology/10th/P-35] </a:t>
-            </a:r>
-          </a:p>
-          <a:p>
-            <a:pPr algn="l">
               <a:defRPr sz="1800"/>
             </a:pPr>
             <a:r>
@@ -10148,7 +9847,7 @@
               <a:defRPr b="1" sz="1800"/>
             </a:pPr>
             <a:r>
-              <a:t>Ans: B</a:t>
+              <a:t>Ans: B [Ref: Robbins Basic Pathology/10th/P-41] </a:t>
             </a:r>
           </a:p>
         </p:txBody>
@@ -10188,14 +9887,6 @@
           <a:p/>
           <a:p>
             <a:pPr algn="l">
-              <a:defRPr b="1" sz="1800"/>
-            </a:pPr>
-            <a:r>
-              <a:t>[Ref: Robbins Basic Pathology/10th/P-41] </a:t>
-            </a:r>
-          </a:p>
-          <a:p>
-            <a:pPr algn="l">
               <a:defRPr sz="1800"/>
             </a:pPr>
             <a:r>
@@ -10289,7 +9980,7 @@
               <a:defRPr b="1" sz="1800"/>
             </a:pPr>
             <a:r>
-              <a:t>Ans: D</a:t>
+              <a:t>Ans: D [Ref: Robbins Basic Pathology/10th/P-53] </a:t>
             </a:r>
           </a:p>
         </p:txBody>

</xml_diff>